<commit_message>
Working on HTML Contents
</commit_message>
<xml_diff>
--- a/learn-web-design-with-easy.pptx
+++ b/learn-web-design-with-easy.pptx
@@ -208,7 +208,7 @@
           <a:p>
             <a:fld id="{1A4DA500-7DAD-40C7-93BD-725118A4BC7C}" type="datetimeFigureOut">
               <a:rPr lang="en-US" smtClean="0"/>
-              <a:t>10/23/2024</a:t>
+              <a:t>10/27/2024</a:t>
             </a:fld>
             <a:endParaRPr lang="en-US"/>
           </a:p>
@@ -777,7 +777,7 @@
           <a:p>
             <a:fld id="{3BC69796-F8E8-4FEB-8BC2-BA9B0FC30C07}" type="datetime1">
               <a:rPr lang="en-US" smtClean="0"/>
-              <a:t>10/23/2024</a:t>
+              <a:t>10/27/2024</a:t>
             </a:fld>
             <a:endParaRPr lang="en-US"/>
           </a:p>
@@ -1175,7 +1175,7 @@
           <a:p>
             <a:fld id="{A3A1DA38-D6E7-4A2B-896A-60C0DAA66193}" type="datetime1">
               <a:rPr lang="en-US" smtClean="0"/>
-              <a:t>10/23/2024</a:t>
+              <a:t>10/27/2024</a:t>
             </a:fld>
             <a:endParaRPr lang="en-US"/>
           </a:p>
@@ -1343,7 +1343,7 @@
           <a:p>
             <a:fld id="{9D180DDF-6477-4C0A-B6B9-16E30D35C132}" type="datetime1">
               <a:rPr lang="en-US" smtClean="0"/>
-              <a:t>10/23/2024</a:t>
+              <a:t>10/27/2024</a:t>
             </a:fld>
             <a:endParaRPr lang="en-US"/>
           </a:p>
@@ -1521,7 +1521,7 @@
           <a:p>
             <a:fld id="{CF64F201-83EE-4771-A0C8-1D3DA42CCA90}" type="datetime1">
               <a:rPr lang="en-US" smtClean="0"/>
-              <a:t>10/23/2024</a:t>
+              <a:t>10/27/2024</a:t>
             </a:fld>
             <a:endParaRPr lang="en-US"/>
           </a:p>
@@ -1711,7 +1711,7 @@
           <a:p>
             <a:fld id="{68A9CA44-3AFD-4879-B31D-D3622FA4623C}" type="datetime1">
               <a:rPr lang="en-US" smtClean="0"/>
-              <a:t>10/23/2024</a:t>
+              <a:t>10/27/2024</a:t>
             </a:fld>
             <a:endParaRPr lang="en-US"/>
           </a:p>
@@ -1879,7 +1879,7 @@
           <a:p>
             <a:fld id="{032408AC-20C9-4598-8551-79CAE625ED83}" type="datetime1">
               <a:rPr lang="en-US" smtClean="0"/>
-              <a:t>10/23/2024</a:t>
+              <a:t>10/27/2024</a:t>
             </a:fld>
             <a:endParaRPr lang="en-US"/>
           </a:p>
@@ -2124,7 +2124,7 @@
           <a:p>
             <a:fld id="{1AFBFBF6-5EDC-49F1-8F87-A71D99F427FE}" type="datetime1">
               <a:rPr lang="en-US" smtClean="0"/>
-              <a:t>10/23/2024</a:t>
+              <a:t>10/27/2024</a:t>
             </a:fld>
             <a:endParaRPr lang="en-US"/>
           </a:p>
@@ -2353,7 +2353,7 @@
           <a:p>
             <a:fld id="{F8DAB1E7-1B6D-4F95-B402-D59F8F425E7C}" type="datetime1">
               <a:rPr lang="en-US" smtClean="0"/>
-              <a:t>10/23/2024</a:t>
+              <a:t>10/27/2024</a:t>
             </a:fld>
             <a:endParaRPr lang="en-US"/>
           </a:p>
@@ -2717,7 +2717,7 @@
           <a:p>
             <a:fld id="{242A892B-A999-4C2C-8C65-054B62EB933D}" type="datetime1">
               <a:rPr lang="en-US" smtClean="0"/>
-              <a:t>10/23/2024</a:t>
+              <a:t>10/27/2024</a:t>
             </a:fld>
             <a:endParaRPr lang="en-US"/>
           </a:p>
@@ -2834,7 +2834,7 @@
           <a:p>
             <a:fld id="{00E232DB-286D-4446-83EB-D79BA2EEEEB6}" type="datetime1">
               <a:rPr lang="en-US" smtClean="0"/>
-              <a:t>10/23/2024</a:t>
+              <a:t>10/27/2024</a:t>
             </a:fld>
             <a:endParaRPr lang="en-US"/>
           </a:p>
@@ -2929,7 +2929,7 @@
           <a:p>
             <a:fld id="{98588E39-84E1-484F-B27F-0AC5FE6FBB77}" type="datetime1">
               <a:rPr lang="en-US" smtClean="0"/>
-              <a:t>10/23/2024</a:t>
+              <a:t>10/27/2024</a:t>
             </a:fld>
             <a:endParaRPr lang="en-US"/>
           </a:p>
@@ -3097,7 +3097,7 @@
           <a:p>
             <a:fld id="{BCC5C59B-AB4A-4FA7-BF5E-47D36D586567}" type="datetime1">
               <a:rPr lang="en-US" smtClean="0"/>
-              <a:t>10/23/2024</a:t>
+              <a:t>10/27/2024</a:t>
             </a:fld>
             <a:endParaRPr lang="en-US"/>
           </a:p>
@@ -3516,7 +3516,7 @@
           <a:p>
             <a:fld id="{B12F3499-3BB1-4D1B-83C2-786A48BA55FA}" type="datetime1">
               <a:rPr lang="en-US" smtClean="0"/>
-              <a:t>10/23/2024</a:t>
+              <a:t>10/27/2024</a:t>
             </a:fld>
             <a:endParaRPr lang="en-US"/>
           </a:p>
@@ -3768,7 +3768,7 @@
           <a:p>
             <a:fld id="{9B5FE25A-F081-418E-87FD-6935C43F40D4}" type="datetime1">
               <a:rPr lang="en-US" smtClean="0"/>
-              <a:t>10/23/2024</a:t>
+              <a:t>10/27/2024</a:t>
             </a:fld>
             <a:endParaRPr lang="en-US"/>
           </a:p>
@@ -3936,7 +3936,7 @@
           <a:p>
             <a:fld id="{28ECC619-5BDB-4A34-BFBC-5DDD09F0E05C}" type="datetime1">
               <a:rPr lang="en-US" smtClean="0"/>
-              <a:t>10/23/2024</a:t>
+              <a:t>10/27/2024</a:t>
             </a:fld>
             <a:endParaRPr lang="en-US"/>
           </a:p>
@@ -4114,7 +4114,7 @@
           <a:p>
             <a:fld id="{63C16340-CBA3-41D6-9C42-72954F5E812F}" type="datetime1">
               <a:rPr lang="en-US" smtClean="0"/>
-              <a:t>10/23/2024</a:t>
+              <a:t>10/27/2024</a:t>
             </a:fld>
             <a:endParaRPr lang="en-US"/>
           </a:p>
@@ -4231,7 +4231,7 @@
           <a:p>
             <a:fld id="{80C9FFB8-AF85-4D38-9A3B-BE0E25CB5D6B}" type="datetime1">
               <a:rPr lang="en-US" smtClean="0"/>
-              <a:t>10/23/2024</a:t>
+              <a:t>10/27/2024</a:t>
             </a:fld>
             <a:endParaRPr lang="en-US"/>
           </a:p>
@@ -4476,7 +4476,7 @@
           <a:p>
             <a:fld id="{E18DC509-A7E2-4D2E-BA94-76B37FA79575}" type="datetime1">
               <a:rPr lang="en-US" smtClean="0"/>
-              <a:t>10/23/2024</a:t>
+              <a:t>10/27/2024</a:t>
             </a:fld>
             <a:endParaRPr lang="en-US"/>
           </a:p>
@@ -4705,7 +4705,7 @@
           <a:p>
             <a:fld id="{1C17A3CF-DE11-47D9-91D0-248C6D0E1CB3}" type="datetime1">
               <a:rPr lang="en-US" smtClean="0"/>
-              <a:t>10/23/2024</a:t>
+              <a:t>10/27/2024</a:t>
             </a:fld>
             <a:endParaRPr lang="en-US"/>
           </a:p>
@@ -5069,7 +5069,7 @@
           <a:p>
             <a:fld id="{66FED7CB-BED4-40AC-A0D7-F9697D77D7D0}" type="datetime1">
               <a:rPr lang="en-US" smtClean="0"/>
-              <a:t>10/23/2024</a:t>
+              <a:t>10/27/2024</a:t>
             </a:fld>
             <a:endParaRPr lang="en-US"/>
           </a:p>
@@ -5186,7 +5186,7 @@
           <a:p>
             <a:fld id="{B7B231E9-19DB-42C5-BA01-54421C295721}" type="datetime1">
               <a:rPr lang="en-US" smtClean="0"/>
-              <a:t>10/23/2024</a:t>
+              <a:t>10/27/2024</a:t>
             </a:fld>
             <a:endParaRPr lang="en-US"/>
           </a:p>
@@ -5281,7 +5281,7 @@
           <a:p>
             <a:fld id="{CDD99760-C570-47D6-858F-90D776F758BC}" type="datetime1">
               <a:rPr lang="en-US" smtClean="0"/>
-              <a:t>10/23/2024</a:t>
+              <a:t>10/27/2024</a:t>
             </a:fld>
             <a:endParaRPr lang="en-US"/>
           </a:p>
@@ -5556,7 +5556,7 @@
           <a:p>
             <a:fld id="{E6A00FE8-651D-4BBA-AA6D-FC3793DD1F46}" type="datetime1">
               <a:rPr lang="en-US" smtClean="0"/>
-              <a:t>10/23/2024</a:t>
+              <a:t>10/27/2024</a:t>
             </a:fld>
             <a:endParaRPr lang="en-US"/>
           </a:p>
@@ -5767,7 +5767,7 @@
           <a:p>
             <a:fld id="{C6C60B84-B9F6-4926-BE35-DEBE01EEBB71}" type="datetime1">
               <a:rPr lang="en-US" smtClean="0"/>
-              <a:t>10/23/2024</a:t>
+              <a:t>10/27/2024</a:t>
             </a:fld>
             <a:endParaRPr lang="en-US"/>
           </a:p>
@@ -6307,7 +6307,7 @@
           <a:p>
             <a:fld id="{3BA51990-D50A-458E-8173-049D397DA89A}" type="datetime1">
               <a:rPr lang="en-US" smtClean="0"/>
-              <a:t>10/23/2024</a:t>
+              <a:t>10/27/2024</a:t>
             </a:fld>
             <a:endParaRPr lang="en-US"/>
           </a:p>

</xml_diff>